<commit_message>
Quote added to ppt
</commit_message>
<xml_diff>
--- a/presentation/ConstrictionPresentation.pptx
+++ b/presentation/ConstrictionPresentation.pptx
@@ -15,19 +15,19 @@
     <p:sldId id="270" r:id="rId6"/>
     <p:sldId id="298" r:id="rId7"/>
     <p:sldId id="299" r:id="rId8"/>
-    <p:sldId id="301" r:id="rId9"/>
-    <p:sldId id="300" r:id="rId10"/>
-    <p:sldId id="303" r:id="rId11"/>
-    <p:sldId id="305" r:id="rId12"/>
-    <p:sldId id="302" r:id="rId13"/>
-    <p:sldId id="304" r:id="rId14"/>
-    <p:sldId id="306" r:id="rId15"/>
-    <p:sldId id="307" r:id="rId16"/>
-    <p:sldId id="309" r:id="rId17"/>
-    <p:sldId id="308" r:id="rId18"/>
-    <p:sldId id="310" r:id="rId19"/>
-    <p:sldId id="278" r:id="rId20"/>
-    <p:sldId id="271" r:id="rId21"/>
+    <p:sldId id="271" r:id="rId9"/>
+    <p:sldId id="301" r:id="rId10"/>
+    <p:sldId id="300" r:id="rId11"/>
+    <p:sldId id="303" r:id="rId12"/>
+    <p:sldId id="305" r:id="rId13"/>
+    <p:sldId id="302" r:id="rId14"/>
+    <p:sldId id="304" r:id="rId15"/>
+    <p:sldId id="306" r:id="rId16"/>
+    <p:sldId id="307" r:id="rId17"/>
+    <p:sldId id="309" r:id="rId18"/>
+    <p:sldId id="308" r:id="rId19"/>
+    <p:sldId id="310" r:id="rId20"/>
+    <p:sldId id="278" r:id="rId21"/>
   </p:sldIdLst>
   <p:sldSz cx="9144000" cy="5143500" type="screen16x9"/>
   <p:notesSz cx="6858000" cy="9144000"/>
@@ -1071,6 +1071,110 @@
   <p:cSld>
     <p:spTree>
       <p:nvGrpSpPr>
+        <p:cNvPr id="1" name="Shape 1129"/>
+        <p:cNvGrpSpPr/>
+        <p:nvPr/>
+      </p:nvGrpSpPr>
+      <p:grpSpPr>
+        <a:xfrm>
+          <a:off x="0" y="0"/>
+          <a:ext cx="0" cy="0"/>
+          <a:chOff x="0" y="0"/>
+          <a:chExt cx="0" cy="0"/>
+        </a:xfrm>
+      </p:grpSpPr>
+      <p:sp>
+        <p:nvSpPr>
+          <p:cNvPr id="1130" name="Google Shape;1130;g72c4329eae_4_10:notes"/>
+          <p:cNvSpPr>
+            <a:spLocks noGrp="1" noRot="1" noChangeAspect="1"/>
+          </p:cNvSpPr>
+          <p:nvPr>
+            <p:ph type="sldImg" idx="2"/>
+          </p:nvPr>
+        </p:nvSpPr>
+        <p:spPr>
+          <a:xfrm>
+            <a:off x="381000" y="685800"/>
+            <a:ext cx="6096000" cy="3429000"/>
+          </a:xfrm>
+          <a:custGeom>
+            <a:avLst/>
+            <a:gdLst/>
+            <a:ahLst/>
+            <a:cxnLst/>
+            <a:rect l="l" t="t" r="r" b="b"/>
+            <a:pathLst>
+              <a:path w="120000" h="120000" extrusionOk="0">
+                <a:moveTo>
+                  <a:pt x="0" y="0"/>
+                </a:moveTo>
+                <a:lnTo>
+                  <a:pt x="120000" y="0"/>
+                </a:lnTo>
+                <a:lnTo>
+                  <a:pt x="120000" y="120000"/>
+                </a:lnTo>
+                <a:lnTo>
+                  <a:pt x="0" y="120000"/>
+                </a:lnTo>
+                <a:close/>
+              </a:path>
+            </a:pathLst>
+          </a:custGeom>
+        </p:spPr>
+      </p:sp>
+      <p:sp>
+        <p:nvSpPr>
+          <p:cNvPr id="1131" name="Google Shape;1131;g72c4329eae_4_10:notes"/>
+          <p:cNvSpPr txBox="1">
+            <a:spLocks noGrp="1"/>
+          </p:cNvSpPr>
+          <p:nvPr>
+            <p:ph type="body" idx="1"/>
+          </p:nvPr>
+        </p:nvSpPr>
+        <p:spPr>
+          <a:xfrm>
+            <a:off x="685800" y="4343400"/>
+            <a:ext cx="5486400" cy="4114800"/>
+          </a:xfrm>
+          <a:prstGeom prst="rect">
+            <a:avLst/>
+          </a:prstGeom>
+        </p:spPr>
+        <p:txBody>
+          <a:bodyPr spcFirstLastPara="1" wrap="square" lIns="91425" tIns="91425" rIns="91425" bIns="91425" anchor="t" anchorCtr="0">
+            <a:noAutofit/>
+          </a:bodyPr>
+          <a:lstStyle/>
+          <a:p>
+            <a:pPr marL="0" lvl="0" indent="0" algn="l" rtl="0">
+              <a:spcBef>
+                <a:spcPts val="0"/>
+              </a:spcBef>
+              <a:spcAft>
+                <a:spcPts val="0"/>
+              </a:spcAft>
+              <a:buNone/>
+            </a:pPr>
+            <a:endParaRPr dirty="0"/>
+          </a:p>
+        </p:txBody>
+      </p:sp>
+    </p:spTree>
+  </p:cSld>
+  <p:clrMapOvr>
+    <a:masterClrMapping/>
+  </p:clrMapOvr>
+</p:notes>
+</file>
+
+<file path=ppt/notesSlides/notesSlide5.xml><?xml version="1.0" encoding="utf-8"?>
+<p:notes xmlns:a="http://schemas.openxmlformats.org/drawingml/2006/main" xmlns:r="http://schemas.openxmlformats.org/officeDocument/2006/relationships" xmlns:p="http://schemas.openxmlformats.org/presentationml/2006/main" showMasterSp="0" showMasterPhAnim="0">
+  <p:cSld>
+    <p:spTree>
+      <p:nvGrpSpPr>
         <p:cNvPr id="1" name="Shape 1357"/>
         <p:cNvGrpSpPr/>
         <p:nvPr/>
@@ -1127,110 +1231,6 @@
       <p:sp>
         <p:nvSpPr>
           <p:cNvPr id="1359" name="Google Shape;1359;g6c52a2e8d8_0_18:notes"/>
-          <p:cNvSpPr txBox="1">
-            <a:spLocks noGrp="1"/>
-          </p:cNvSpPr>
-          <p:nvPr>
-            <p:ph type="body" idx="1"/>
-          </p:nvPr>
-        </p:nvSpPr>
-        <p:spPr>
-          <a:xfrm>
-            <a:off x="685800" y="4343400"/>
-            <a:ext cx="5486400" cy="4114800"/>
-          </a:xfrm>
-          <a:prstGeom prst="rect">
-            <a:avLst/>
-          </a:prstGeom>
-        </p:spPr>
-        <p:txBody>
-          <a:bodyPr spcFirstLastPara="1" wrap="square" lIns="91425" tIns="91425" rIns="91425" bIns="91425" anchor="t" anchorCtr="0">
-            <a:noAutofit/>
-          </a:bodyPr>
-          <a:lstStyle/>
-          <a:p>
-            <a:pPr marL="0" lvl="0" indent="0" algn="l" rtl="0">
-              <a:spcBef>
-                <a:spcPts val="0"/>
-              </a:spcBef>
-              <a:spcAft>
-                <a:spcPts val="0"/>
-              </a:spcAft>
-              <a:buNone/>
-            </a:pPr>
-            <a:endParaRPr dirty="0"/>
-          </a:p>
-        </p:txBody>
-      </p:sp>
-    </p:spTree>
-  </p:cSld>
-  <p:clrMapOvr>
-    <a:masterClrMapping/>
-  </p:clrMapOvr>
-</p:notes>
-</file>
-
-<file path=ppt/notesSlides/notesSlide5.xml><?xml version="1.0" encoding="utf-8"?>
-<p:notes xmlns:a="http://schemas.openxmlformats.org/drawingml/2006/main" xmlns:r="http://schemas.openxmlformats.org/officeDocument/2006/relationships" xmlns:p="http://schemas.openxmlformats.org/presentationml/2006/main" showMasterSp="0" showMasterPhAnim="0">
-  <p:cSld>
-    <p:spTree>
-      <p:nvGrpSpPr>
-        <p:cNvPr id="1" name="Shape 1129"/>
-        <p:cNvGrpSpPr/>
-        <p:nvPr/>
-      </p:nvGrpSpPr>
-      <p:grpSpPr>
-        <a:xfrm>
-          <a:off x="0" y="0"/>
-          <a:ext cx="0" cy="0"/>
-          <a:chOff x="0" y="0"/>
-          <a:chExt cx="0" cy="0"/>
-        </a:xfrm>
-      </p:grpSpPr>
-      <p:sp>
-        <p:nvSpPr>
-          <p:cNvPr id="1130" name="Google Shape;1130;g72c4329eae_4_10:notes"/>
-          <p:cNvSpPr>
-            <a:spLocks noGrp="1" noRot="1" noChangeAspect="1"/>
-          </p:cNvSpPr>
-          <p:nvPr>
-            <p:ph type="sldImg" idx="2"/>
-          </p:nvPr>
-        </p:nvSpPr>
-        <p:spPr>
-          <a:xfrm>
-            <a:off x="381000" y="685800"/>
-            <a:ext cx="6096000" cy="3429000"/>
-          </a:xfrm>
-          <a:custGeom>
-            <a:avLst/>
-            <a:gdLst/>
-            <a:ahLst/>
-            <a:cxnLst/>
-            <a:rect l="l" t="t" r="r" b="b"/>
-            <a:pathLst>
-              <a:path w="120000" h="120000" extrusionOk="0">
-                <a:moveTo>
-                  <a:pt x="0" y="0"/>
-                </a:moveTo>
-                <a:lnTo>
-                  <a:pt x="120000" y="0"/>
-                </a:lnTo>
-                <a:lnTo>
-                  <a:pt x="120000" y="120000"/>
-                </a:lnTo>
-                <a:lnTo>
-                  <a:pt x="0" y="120000"/>
-                </a:lnTo>
-                <a:close/>
-              </a:path>
-            </a:pathLst>
-          </a:custGeom>
-        </p:spPr>
-      </p:sp>
-      <p:sp>
-        <p:nvSpPr>
-          <p:cNvPr id="1131" name="Google Shape;1131;g72c4329eae_4_10:notes"/>
           <p:cNvSpPr txBox="1">
             <a:spLocks noGrp="1"/>
           </p:cNvSpPr>
@@ -15990,6 +15990,270 @@
           <p:cNvPr id="2" name="Tijdelijke aanduiding voor tekst 1">
             <a:extLst>
               <a:ext uri="{FF2B5EF4-FFF2-40B4-BE49-F238E27FC236}">
+                <a16:creationId xmlns:a16="http://schemas.microsoft.com/office/drawing/2014/main" id="{0856D0CC-BF2A-4D94-9682-31AD7DD4BD4F}"/>
+              </a:ext>
+            </a:extLst>
+          </p:cNvPr>
+          <p:cNvSpPr>
+            <a:spLocks noGrp="1"/>
+          </p:cNvSpPr>
+          <p:nvPr>
+            <p:ph type="body" idx="1"/>
+          </p:nvPr>
+        </p:nvSpPr>
+        <p:spPr>
+          <a:xfrm>
+            <a:off x="618305" y="989475"/>
+            <a:ext cx="4727699" cy="3742350"/>
+          </a:xfrm>
+        </p:spPr>
+        <p:txBody>
+          <a:bodyPr/>
+          <a:lstStyle/>
+          <a:p>
+            <a:r>
+              <a:rPr lang="nl-BE" dirty="0"/>
+              <a:t>Data is </a:t>
+            </a:r>
+            <a:r>
+              <a:rPr lang="nl-BE" dirty="0" err="1"/>
+              <a:t>imbalanced</a:t>
+            </a:r>
+            <a:endParaRPr lang="nl-BE" dirty="0"/>
+          </a:p>
+          <a:p>
+            <a:pPr lvl="1"/>
+            <a:r>
+              <a:rPr lang="nl-BE" dirty="0"/>
+              <a:t>Downsampling </a:t>
+            </a:r>
+          </a:p>
+          <a:p>
+            <a:pPr lvl="1"/>
+            <a:r>
+              <a:rPr lang="nl-BE" dirty="0" err="1"/>
+              <a:t>Reduce</a:t>
+            </a:r>
+            <a:r>
+              <a:rPr lang="nl-BE" dirty="0"/>
+              <a:t> datapoints                                              </a:t>
+            </a:r>
+            <a:r>
+              <a:rPr lang="nl-BE" dirty="0" err="1"/>
+              <a:t>from</a:t>
+            </a:r>
+            <a:r>
+              <a:rPr lang="nl-BE" dirty="0"/>
+              <a:t> </a:t>
+            </a:r>
+            <a:r>
+              <a:rPr lang="nl-BE" dirty="0" err="1"/>
+              <a:t>unconstricted</a:t>
+            </a:r>
+            <a:r>
+              <a:rPr lang="nl-BE" dirty="0"/>
+              <a:t> </a:t>
+            </a:r>
+            <a:r>
+              <a:rPr lang="nl-BE" dirty="0" err="1"/>
+              <a:t>coils</a:t>
+            </a:r>
+            <a:endParaRPr lang="nl-BE" dirty="0"/>
+          </a:p>
+          <a:p>
+            <a:pPr lvl="1"/>
+            <a:endParaRPr lang="nl-BE" dirty="0"/>
+          </a:p>
+          <a:p>
+            <a:r>
+              <a:rPr lang="nl-BE" dirty="0"/>
+              <a:t>Feature </a:t>
+            </a:r>
+            <a:r>
+              <a:rPr lang="nl-BE" dirty="0" err="1"/>
+              <a:t>Selection</a:t>
+            </a:r>
+            <a:endParaRPr lang="nl-BE" dirty="0"/>
+          </a:p>
+          <a:p>
+            <a:pPr lvl="1"/>
+            <a:r>
+              <a:rPr lang="nl-BE" dirty="0" err="1"/>
+              <a:t>Selecting</a:t>
+            </a:r>
+            <a:r>
+              <a:rPr lang="nl-BE" dirty="0"/>
+              <a:t> most </a:t>
+            </a:r>
+            <a:r>
+              <a:rPr lang="nl-BE" dirty="0" err="1"/>
+              <a:t>impactful</a:t>
+            </a:r>
+            <a:r>
+              <a:rPr lang="nl-BE" dirty="0"/>
+              <a:t> features</a:t>
+            </a:r>
+          </a:p>
+          <a:p>
+            <a:pPr lvl="1"/>
+            <a:r>
+              <a:rPr lang="nl-BE" dirty="0" err="1"/>
+              <a:t>Graphing</a:t>
+            </a:r>
+            <a:r>
+              <a:rPr lang="nl-BE" dirty="0"/>
+              <a:t> features</a:t>
+            </a:r>
+          </a:p>
+          <a:p>
+            <a:pPr lvl="1"/>
+            <a:r>
+              <a:rPr lang="nl-BE" dirty="0" err="1"/>
+              <a:t>Calculating</a:t>
+            </a:r>
+            <a:r>
+              <a:rPr lang="nl-BE" dirty="0"/>
+              <a:t> feature </a:t>
+            </a:r>
+            <a:r>
+              <a:rPr lang="nl-BE" dirty="0" err="1"/>
+              <a:t>importance</a:t>
+            </a:r>
+            <a:endParaRPr lang="nl-BE" dirty="0"/>
+          </a:p>
+          <a:p>
+            <a:endParaRPr lang="nl-BE" dirty="0"/>
+          </a:p>
+          <a:p>
+            <a:pPr marL="152400" indent="0">
+              <a:buNone/>
+            </a:pPr>
+            <a:endParaRPr lang="nl-BE" dirty="0"/>
+          </a:p>
+          <a:p>
+            <a:pPr lvl="1"/>
+            <a:endParaRPr lang="nl-BE" dirty="0"/>
+          </a:p>
+        </p:txBody>
+      </p:sp>
+      <p:sp>
+        <p:nvSpPr>
+          <p:cNvPr id="5" name="Titel 4">
+            <a:extLst>
+              <a:ext uri="{FF2B5EF4-FFF2-40B4-BE49-F238E27FC236}">
+                <a16:creationId xmlns:a16="http://schemas.microsoft.com/office/drawing/2014/main" id="{D0717BD0-3FC4-43AE-94BE-0BBB3BD4F3C6}"/>
+              </a:ext>
+            </a:extLst>
+          </p:cNvPr>
+          <p:cNvSpPr>
+            <a:spLocks noGrp="1"/>
+          </p:cNvSpPr>
+          <p:nvPr>
+            <p:ph type="ctrTitle"/>
+          </p:nvPr>
+        </p:nvSpPr>
+        <p:spPr/>
+        <p:txBody>
+          <a:bodyPr/>
+          <a:lstStyle/>
+          <a:p>
+            <a:r>
+              <a:rPr lang="nl-BE" dirty="0"/>
+              <a:t>Data </a:t>
+            </a:r>
+            <a:r>
+              <a:rPr lang="nl-BE" dirty="0" err="1"/>
+              <a:t>Preparation</a:t>
+            </a:r>
+            <a:r>
+              <a:rPr lang="nl-BE" dirty="0"/>
+              <a:t> </a:t>
+            </a:r>
+          </a:p>
+        </p:txBody>
+      </p:sp>
+      <p:pic>
+        <p:nvPicPr>
+          <p:cNvPr id="4102" name="Picture 6">
+            <a:extLst>
+              <a:ext uri="{FF2B5EF4-FFF2-40B4-BE49-F238E27FC236}">
+                <a16:creationId xmlns:a16="http://schemas.microsoft.com/office/drawing/2014/main" id="{6E35B287-3AFB-4A3F-9DF0-C5C1488CA020}"/>
+              </a:ext>
+            </a:extLst>
+          </p:cNvPr>
+          <p:cNvPicPr>
+            <a:picLocks noChangeAspect="1" noChangeArrowheads="1"/>
+          </p:cNvPicPr>
+          <p:nvPr/>
+        </p:nvPicPr>
+        <p:blipFill>
+          <a:blip r:embed="rId2">
+            <a:extLst>
+              <a:ext uri="{28A0092B-C50C-407E-A947-70E740481C1C}">
+                <a14:useLocalDpi xmlns:a14="http://schemas.microsoft.com/office/drawing/2010/main" val="0"/>
+              </a:ext>
+            </a:extLst>
+          </a:blip>
+          <a:srcRect/>
+          <a:stretch>
+            <a:fillRect/>
+          </a:stretch>
+        </p:blipFill>
+        <p:spPr bwMode="auto">
+          <a:xfrm>
+            <a:off x="3818188" y="700575"/>
+            <a:ext cx="4935352" cy="2470477"/>
+          </a:xfrm>
+          <a:prstGeom prst="rect">
+            <a:avLst/>
+          </a:prstGeom>
+          <a:noFill/>
+          <a:extLst>
+            <a:ext uri="{909E8E84-426E-40DD-AFC4-6F175D3DCCD1}">
+              <a14:hiddenFill xmlns:a14="http://schemas.microsoft.com/office/drawing/2010/main">
+                <a:solidFill>
+                  <a:srgbClr val="FFFFFF"/>
+                </a:solidFill>
+              </a14:hiddenFill>
+            </a:ext>
+          </a:extLst>
+        </p:spPr>
+      </p:pic>
+    </p:spTree>
+    <p:extLst>
+      <p:ext uri="{BB962C8B-B14F-4D97-AF65-F5344CB8AC3E}">
+        <p14:creationId xmlns:p14="http://schemas.microsoft.com/office/powerpoint/2010/main" val="1845498978"/>
+      </p:ext>
+    </p:extLst>
+  </p:cSld>
+  <p:clrMapOvr>
+    <a:masterClrMapping/>
+  </p:clrMapOvr>
+</p:sld>
+</file>
+
+<file path=ppt/slides/slide11.xml><?xml version="1.0" encoding="utf-8"?>
+<p:sld xmlns:a="http://schemas.openxmlformats.org/drawingml/2006/main" xmlns:r="http://schemas.openxmlformats.org/officeDocument/2006/relationships" xmlns:p="http://schemas.openxmlformats.org/presentationml/2006/main">
+  <p:cSld>
+    <p:spTree>
+      <p:nvGrpSpPr>
+        <p:cNvPr id="1" name=""/>
+        <p:cNvGrpSpPr/>
+        <p:nvPr/>
+      </p:nvGrpSpPr>
+      <p:grpSpPr>
+        <a:xfrm>
+          <a:off x="0" y="0"/>
+          <a:ext cx="0" cy="0"/>
+          <a:chOff x="0" y="0"/>
+          <a:chExt cx="0" cy="0"/>
+        </a:xfrm>
+      </p:grpSpPr>
+      <p:sp>
+        <p:nvSpPr>
+          <p:cNvPr id="2" name="Tijdelijke aanduiding voor tekst 1">
+            <a:extLst>
+              <a:ext uri="{FF2B5EF4-FFF2-40B4-BE49-F238E27FC236}">
                 <a16:creationId xmlns:a16="http://schemas.microsoft.com/office/drawing/2014/main" id="{30909543-0763-4DDD-9FFE-14A28728FC8C}"/>
               </a:ext>
             </a:extLst>
@@ -16123,7 +16387,7 @@
 </p:sld>
 </file>
 
-<file path=ppt/slides/slide11.xml><?xml version="1.0" encoding="utf-8"?>
+<file path=ppt/slides/slide12.xml><?xml version="1.0" encoding="utf-8"?>
 <p:sld xmlns:a="http://schemas.openxmlformats.org/drawingml/2006/main" xmlns:r="http://schemas.openxmlformats.org/officeDocument/2006/relationships" xmlns:p="http://schemas.openxmlformats.org/presentationml/2006/main">
   <p:cSld>
     <p:spTree>
@@ -16359,7 +16623,7 @@
 </p:sld>
 </file>
 
-<file path=ppt/slides/slide12.xml><?xml version="1.0" encoding="utf-8"?>
+<file path=ppt/slides/slide13.xml><?xml version="1.0" encoding="utf-8"?>
 <p:sld xmlns:a="http://schemas.openxmlformats.org/drawingml/2006/main" xmlns:r="http://schemas.openxmlformats.org/officeDocument/2006/relationships" xmlns:p="http://schemas.openxmlformats.org/presentationml/2006/main">
   <p:cSld>
     <p:spTree>
@@ -16631,7 +16895,7 @@
 </p:sld>
 </file>
 
-<file path=ppt/slides/slide13.xml><?xml version="1.0" encoding="utf-8"?>
+<file path=ppt/slides/slide14.xml><?xml version="1.0" encoding="utf-8"?>
 <p:sld xmlns:a="http://schemas.openxmlformats.org/drawingml/2006/main" xmlns:r="http://schemas.openxmlformats.org/officeDocument/2006/relationships" xmlns:p="http://schemas.openxmlformats.org/presentationml/2006/main">
   <p:cSld>
     <p:spTree>
@@ -16939,7 +17203,7 @@
 </p:sld>
 </file>
 
-<file path=ppt/slides/slide14.xml><?xml version="1.0" encoding="utf-8"?>
+<file path=ppt/slides/slide15.xml><?xml version="1.0" encoding="utf-8"?>
 <p:sld xmlns:a="http://schemas.openxmlformats.org/drawingml/2006/main" xmlns:r="http://schemas.openxmlformats.org/officeDocument/2006/relationships" xmlns:p="http://schemas.openxmlformats.org/presentationml/2006/main">
   <p:cSld>
     <p:spTree>
@@ -17166,7 +17430,7 @@
 </p:sld>
 </file>
 
-<file path=ppt/slides/slide15.xml><?xml version="1.0" encoding="utf-8"?>
+<file path=ppt/slides/slide16.xml><?xml version="1.0" encoding="utf-8"?>
 <p:sld xmlns:a="http://schemas.openxmlformats.org/drawingml/2006/main" xmlns:r="http://schemas.openxmlformats.org/officeDocument/2006/relationships" xmlns:p="http://schemas.openxmlformats.org/presentationml/2006/main">
   <p:cSld>
     <p:spTree>
@@ -17453,7 +17717,7 @@
 </p:sld>
 </file>
 
-<file path=ppt/slides/slide16.xml><?xml version="1.0" encoding="utf-8"?>
+<file path=ppt/slides/slide17.xml><?xml version="1.0" encoding="utf-8"?>
 <p:sld xmlns:a="http://schemas.openxmlformats.org/drawingml/2006/main" xmlns:r="http://schemas.openxmlformats.org/officeDocument/2006/relationships" xmlns:p="http://schemas.openxmlformats.org/presentationml/2006/main">
   <p:cSld>
     <p:spTree>
@@ -17637,7 +17901,7 @@
 </p:sld>
 </file>
 
-<file path=ppt/slides/slide17.xml><?xml version="1.0" encoding="utf-8"?>
+<file path=ppt/slides/slide18.xml><?xml version="1.0" encoding="utf-8"?>
 <p:sld xmlns:a="http://schemas.openxmlformats.org/drawingml/2006/main" xmlns:r="http://schemas.openxmlformats.org/officeDocument/2006/relationships" xmlns:p="http://schemas.openxmlformats.org/presentationml/2006/main">
   <p:cSld>
     <p:spTree>
@@ -17825,6 +18089,12 @@
             <a:endParaRPr lang="nl-BE" dirty="0"/>
           </a:p>
           <a:p>
+            <a:pPr marL="152400" indent="0">
+              <a:buNone/>
+            </a:pPr>
+            <a:endParaRPr lang="nl-BE" dirty="0"/>
+          </a:p>
+          <a:p>
             <a:endParaRPr lang="nl-BE" dirty="0"/>
           </a:p>
         </p:txBody>
@@ -17871,7 +18141,7 @@
 </p:sld>
 </file>
 
-<file path=ppt/slides/slide18.xml><?xml version="1.0" encoding="utf-8"?>
+<file path=ppt/slides/slide19.xml><?xml version="1.0" encoding="utf-8"?>
 <p:sld xmlns:a="http://schemas.openxmlformats.org/drawingml/2006/main" xmlns:r="http://schemas.openxmlformats.org/officeDocument/2006/relationships" xmlns:p="http://schemas.openxmlformats.org/presentationml/2006/main">
   <p:cSld>
     <p:spTree>
@@ -20204,115 +20474,6 @@
           </a:extLst>
         </p:spPr>
       </p:pic>
-    </p:spTree>
-  </p:cSld>
-  <p:clrMapOvr>
-    <a:masterClrMapping/>
-  </p:clrMapOvr>
-</p:sld>
-</file>
-
-<file path=ppt/slides/slide19.xml><?xml version="1.0" encoding="utf-8"?>
-<p:sld xmlns:a="http://schemas.openxmlformats.org/drawingml/2006/main" xmlns:r="http://schemas.openxmlformats.org/officeDocument/2006/relationships" xmlns:p="http://schemas.openxmlformats.org/presentationml/2006/main">
-  <p:cSld>
-    <p:spTree>
-      <p:nvGrpSpPr>
-        <p:cNvPr id="1" name="Shape 1132"/>
-        <p:cNvGrpSpPr/>
-        <p:nvPr/>
-      </p:nvGrpSpPr>
-      <p:grpSpPr>
-        <a:xfrm>
-          <a:off x="0" y="0"/>
-          <a:ext cx="0" cy="0"/>
-          <a:chOff x="0" y="0"/>
-          <a:chExt cx="0" cy="0"/>
-        </a:xfrm>
-      </p:grpSpPr>
-      <p:sp>
-        <p:nvSpPr>
-          <p:cNvPr id="1133" name="Google Shape;1133;p40"/>
-          <p:cNvSpPr txBox="1">
-            <a:spLocks noGrp="1"/>
-          </p:cNvSpPr>
-          <p:nvPr>
-            <p:ph type="ctrTitle"/>
-          </p:nvPr>
-        </p:nvSpPr>
-        <p:spPr>
-          <a:xfrm>
-            <a:off x="3044100" y="3247750"/>
-            <a:ext cx="3055800" cy="547800"/>
-          </a:xfrm>
-          <a:prstGeom prst="rect">
-            <a:avLst/>
-          </a:prstGeom>
-        </p:spPr>
-        <p:txBody>
-          <a:bodyPr spcFirstLastPara="1" wrap="square" lIns="91425" tIns="91425" rIns="91425" bIns="91425" anchor="t" anchorCtr="0">
-            <a:noAutofit/>
-          </a:bodyPr>
-          <a:lstStyle/>
-          <a:p>
-            <a:pPr marL="0" lvl="0" indent="0" algn="ctr" rtl="0">
-              <a:spcBef>
-                <a:spcPts val="0"/>
-              </a:spcBef>
-              <a:spcAft>
-                <a:spcPts val="0"/>
-              </a:spcAft>
-              <a:buNone/>
-            </a:pPr>
-            <a:r>
-              <a:rPr lang="en"/>
-              <a:t>—SOMEONE FAMOUS</a:t>
-            </a:r>
-            <a:endParaRPr dirty="0"/>
-          </a:p>
-        </p:txBody>
-      </p:sp>
-      <p:sp>
-        <p:nvSpPr>
-          <p:cNvPr id="1134" name="Google Shape;1134;p40"/>
-          <p:cNvSpPr txBox="1">
-            <a:spLocks noGrp="1"/>
-          </p:cNvSpPr>
-          <p:nvPr>
-            <p:ph type="subTitle" idx="1"/>
-          </p:nvPr>
-        </p:nvSpPr>
-        <p:spPr>
-          <a:xfrm>
-            <a:off x="2333000" y="1423125"/>
-            <a:ext cx="4478100" cy="1701900"/>
-          </a:xfrm>
-          <a:prstGeom prst="rect">
-            <a:avLst/>
-          </a:prstGeom>
-        </p:spPr>
-        <p:txBody>
-          <a:bodyPr spcFirstLastPara="1" wrap="square" lIns="91425" tIns="91425" rIns="91425" bIns="91425" anchor="b" anchorCtr="0">
-            <a:noAutofit/>
-          </a:bodyPr>
-          <a:lstStyle/>
-          <a:p>
-            <a:pPr marL="0" lvl="0" indent="0" algn="ctr" rtl="0">
-              <a:spcBef>
-                <a:spcPts val="0"/>
-              </a:spcBef>
-              <a:spcAft>
-                <a:spcPts val="0"/>
-              </a:spcAft>
-              <a:buNone/>
-            </a:pPr>
-            <a:r>
-              <a:rPr lang="en" sz="2400"/>
-              <a:t>“This is a quote. Words full of wisdom that someone important said and can make the reader get inspired.”</a:t>
-            </a:r>
-            <a:endParaRPr sz="2400" dirty="0"/>
-          </a:p>
-        </p:txBody>
-      </p:sp>
     </p:spTree>
   </p:cSld>
   <p:clrMapOvr>
@@ -26680,6 +26841,119 @@
 </file>
 
 <file path=ppt/slides/slide7.xml><?xml version="1.0" encoding="utf-8"?>
+<p:sld xmlns:a="http://schemas.openxmlformats.org/drawingml/2006/main" xmlns:r="http://schemas.openxmlformats.org/officeDocument/2006/relationships" xmlns:p="http://schemas.openxmlformats.org/presentationml/2006/main">
+  <p:cSld>
+    <p:spTree>
+      <p:nvGrpSpPr>
+        <p:cNvPr id="1" name="Shape 1132"/>
+        <p:cNvGrpSpPr/>
+        <p:nvPr/>
+      </p:nvGrpSpPr>
+      <p:grpSpPr>
+        <a:xfrm>
+          <a:off x="0" y="0"/>
+          <a:ext cx="0" cy="0"/>
+          <a:chOff x="0" y="0"/>
+          <a:chExt cx="0" cy="0"/>
+        </a:xfrm>
+      </p:grpSpPr>
+      <p:sp>
+        <p:nvSpPr>
+          <p:cNvPr id="1133" name="Google Shape;1133;p40"/>
+          <p:cNvSpPr txBox="1">
+            <a:spLocks noGrp="1"/>
+          </p:cNvSpPr>
+          <p:nvPr>
+            <p:ph type="ctrTitle"/>
+          </p:nvPr>
+        </p:nvSpPr>
+        <p:spPr>
+          <a:xfrm>
+            <a:off x="3044100" y="3456180"/>
+            <a:ext cx="3055800" cy="547800"/>
+          </a:xfrm>
+          <a:prstGeom prst="rect">
+            <a:avLst/>
+          </a:prstGeom>
+        </p:spPr>
+        <p:txBody>
+          <a:bodyPr spcFirstLastPara="1" wrap="square" lIns="91425" tIns="91425" rIns="91425" bIns="91425" anchor="t" anchorCtr="0">
+            <a:noAutofit/>
+          </a:bodyPr>
+          <a:lstStyle/>
+          <a:p>
+            <a:pPr marL="0" lvl="0" indent="0" algn="ctr" rtl="0">
+              <a:spcBef>
+                <a:spcPts val="0"/>
+              </a:spcBef>
+              <a:spcAft>
+                <a:spcPts val="0"/>
+              </a:spcAft>
+              <a:buNone/>
+            </a:pPr>
+            <a:r>
+              <a:rPr lang="en" i="1" dirty="0"/>
+              <a:t>—</a:t>
+            </a:r>
+            <a:r>
+              <a:rPr lang="en-GB" sz="2400" i="1" dirty="0"/>
+              <a:t>Nelson Mandela</a:t>
+            </a:r>
+            <a:endParaRPr i="1" dirty="0"/>
+          </a:p>
+        </p:txBody>
+      </p:sp>
+      <p:sp>
+        <p:nvSpPr>
+          <p:cNvPr id="1134" name="Google Shape;1134;p40"/>
+          <p:cNvSpPr txBox="1">
+            <a:spLocks noGrp="1"/>
+          </p:cNvSpPr>
+          <p:nvPr>
+            <p:ph type="subTitle" idx="1"/>
+          </p:nvPr>
+        </p:nvSpPr>
+        <p:spPr>
+          <a:xfrm>
+            <a:off x="1653922" y="1065299"/>
+            <a:ext cx="6111754" cy="2456351"/>
+          </a:xfrm>
+          <a:prstGeom prst="rect">
+            <a:avLst/>
+          </a:prstGeom>
+        </p:spPr>
+        <p:txBody>
+          <a:bodyPr spcFirstLastPara="1" wrap="square" lIns="91425" tIns="91425" rIns="91425" bIns="91425" anchor="b" anchorCtr="0">
+            <a:noAutofit/>
+          </a:bodyPr>
+          <a:lstStyle/>
+          <a:p>
+            <a:pPr marL="0" lvl="0" indent="0" algn="ctr" rtl="0">
+              <a:spcBef>
+                <a:spcPts val="0"/>
+              </a:spcBef>
+              <a:spcAft>
+                <a:spcPts val="0"/>
+              </a:spcAft>
+              <a:buNone/>
+            </a:pPr>
+            <a:r>
+              <a:rPr lang="en-GB" sz="5400" dirty="0"/>
+              <a:t>“It always seems impossible until it is done.”</a:t>
+            </a:r>
+            <a:endParaRPr sz="5400" dirty="0"/>
+          </a:p>
+        </p:txBody>
+      </p:sp>
+    </p:spTree>
+  </p:cSld>
+  <p:clrMapOvr>
+    <a:masterClrMapping/>
+  </p:clrMapOvr>
+</p:sld>
+</file>
+
+<file path=ppt/slides/slide8.xml><?xml version="1.0" encoding="utf-8"?>
 <p:sld xmlns:a="http://schemas.openxmlformats.org/drawingml/2006/main" xmlns:r="http://schemas.openxmlformats.org/officeDocument/2006/relationships" xmlns:p="http://schemas.openxmlformats.org/presentationml/2006/main">
   <p:cSld>
     <p:spTree>
@@ -32790,7 +33064,7 @@
 </p:sld>
 </file>
 
-<file path=ppt/slides/slide8.xml><?xml version="1.0" encoding="utf-8"?>
+<file path=ppt/slides/slide9.xml><?xml version="1.0" encoding="utf-8"?>
 <p:sld xmlns:a="http://schemas.openxmlformats.org/drawingml/2006/main" xmlns:r="http://schemas.openxmlformats.org/officeDocument/2006/relationships" xmlns:p="http://schemas.openxmlformats.org/presentationml/2006/main">
   <p:cSld>
     <p:spTree>
@@ -33061,270 +33335,6 @@
     <p:extLst>
       <p:ext uri="{BB962C8B-B14F-4D97-AF65-F5344CB8AC3E}">
         <p14:creationId xmlns:p14="http://schemas.microsoft.com/office/powerpoint/2010/main" val="3851939015"/>
-      </p:ext>
-    </p:extLst>
-  </p:cSld>
-  <p:clrMapOvr>
-    <a:masterClrMapping/>
-  </p:clrMapOvr>
-</p:sld>
-</file>
-
-<file path=ppt/slides/slide9.xml><?xml version="1.0" encoding="utf-8"?>
-<p:sld xmlns:a="http://schemas.openxmlformats.org/drawingml/2006/main" xmlns:r="http://schemas.openxmlformats.org/officeDocument/2006/relationships" xmlns:p="http://schemas.openxmlformats.org/presentationml/2006/main">
-  <p:cSld>
-    <p:spTree>
-      <p:nvGrpSpPr>
-        <p:cNvPr id="1" name=""/>
-        <p:cNvGrpSpPr/>
-        <p:nvPr/>
-      </p:nvGrpSpPr>
-      <p:grpSpPr>
-        <a:xfrm>
-          <a:off x="0" y="0"/>
-          <a:ext cx="0" cy="0"/>
-          <a:chOff x="0" y="0"/>
-          <a:chExt cx="0" cy="0"/>
-        </a:xfrm>
-      </p:grpSpPr>
-      <p:sp>
-        <p:nvSpPr>
-          <p:cNvPr id="2" name="Tijdelijke aanduiding voor tekst 1">
-            <a:extLst>
-              <a:ext uri="{FF2B5EF4-FFF2-40B4-BE49-F238E27FC236}">
-                <a16:creationId xmlns:a16="http://schemas.microsoft.com/office/drawing/2014/main" id="{0856D0CC-BF2A-4D94-9682-31AD7DD4BD4F}"/>
-              </a:ext>
-            </a:extLst>
-          </p:cNvPr>
-          <p:cNvSpPr>
-            <a:spLocks noGrp="1"/>
-          </p:cNvSpPr>
-          <p:nvPr>
-            <p:ph type="body" idx="1"/>
-          </p:nvPr>
-        </p:nvSpPr>
-        <p:spPr>
-          <a:xfrm>
-            <a:off x="618305" y="989475"/>
-            <a:ext cx="4727699" cy="3742350"/>
-          </a:xfrm>
-        </p:spPr>
-        <p:txBody>
-          <a:bodyPr/>
-          <a:lstStyle/>
-          <a:p>
-            <a:r>
-              <a:rPr lang="nl-BE" dirty="0"/>
-              <a:t>Data is </a:t>
-            </a:r>
-            <a:r>
-              <a:rPr lang="nl-BE" dirty="0" err="1"/>
-              <a:t>imbalanced</a:t>
-            </a:r>
-            <a:endParaRPr lang="nl-BE" dirty="0"/>
-          </a:p>
-          <a:p>
-            <a:pPr lvl="1"/>
-            <a:r>
-              <a:rPr lang="nl-BE" dirty="0"/>
-              <a:t>Downsampling </a:t>
-            </a:r>
-          </a:p>
-          <a:p>
-            <a:pPr lvl="1"/>
-            <a:r>
-              <a:rPr lang="nl-BE" dirty="0" err="1"/>
-              <a:t>Reduce</a:t>
-            </a:r>
-            <a:r>
-              <a:rPr lang="nl-BE" dirty="0"/>
-              <a:t> datapoints                                              </a:t>
-            </a:r>
-            <a:r>
-              <a:rPr lang="nl-BE" dirty="0" err="1"/>
-              <a:t>from</a:t>
-            </a:r>
-            <a:r>
-              <a:rPr lang="nl-BE" dirty="0"/>
-              <a:t> </a:t>
-            </a:r>
-            <a:r>
-              <a:rPr lang="nl-BE" dirty="0" err="1"/>
-              <a:t>unconstricted</a:t>
-            </a:r>
-            <a:r>
-              <a:rPr lang="nl-BE" dirty="0"/>
-              <a:t> </a:t>
-            </a:r>
-            <a:r>
-              <a:rPr lang="nl-BE" dirty="0" err="1"/>
-              <a:t>coils</a:t>
-            </a:r>
-            <a:endParaRPr lang="nl-BE" dirty="0"/>
-          </a:p>
-          <a:p>
-            <a:pPr lvl="1"/>
-            <a:endParaRPr lang="nl-BE" dirty="0"/>
-          </a:p>
-          <a:p>
-            <a:r>
-              <a:rPr lang="nl-BE" dirty="0"/>
-              <a:t>Feature </a:t>
-            </a:r>
-            <a:r>
-              <a:rPr lang="nl-BE" dirty="0" err="1"/>
-              <a:t>Selection</a:t>
-            </a:r>
-            <a:endParaRPr lang="nl-BE" dirty="0"/>
-          </a:p>
-          <a:p>
-            <a:pPr lvl="1"/>
-            <a:r>
-              <a:rPr lang="nl-BE" dirty="0" err="1"/>
-              <a:t>Selecting</a:t>
-            </a:r>
-            <a:r>
-              <a:rPr lang="nl-BE" dirty="0"/>
-              <a:t> most </a:t>
-            </a:r>
-            <a:r>
-              <a:rPr lang="nl-BE" dirty="0" err="1"/>
-              <a:t>impactful</a:t>
-            </a:r>
-            <a:r>
-              <a:rPr lang="nl-BE" dirty="0"/>
-              <a:t> features</a:t>
-            </a:r>
-          </a:p>
-          <a:p>
-            <a:pPr lvl="1"/>
-            <a:r>
-              <a:rPr lang="nl-BE" dirty="0" err="1"/>
-              <a:t>Graphing</a:t>
-            </a:r>
-            <a:r>
-              <a:rPr lang="nl-BE" dirty="0"/>
-              <a:t> features</a:t>
-            </a:r>
-          </a:p>
-          <a:p>
-            <a:pPr lvl="1"/>
-            <a:r>
-              <a:rPr lang="nl-BE" dirty="0" err="1"/>
-              <a:t>Calculating</a:t>
-            </a:r>
-            <a:r>
-              <a:rPr lang="nl-BE" dirty="0"/>
-              <a:t> feature </a:t>
-            </a:r>
-            <a:r>
-              <a:rPr lang="nl-BE" dirty="0" err="1"/>
-              <a:t>importance</a:t>
-            </a:r>
-            <a:endParaRPr lang="nl-BE" dirty="0"/>
-          </a:p>
-          <a:p>
-            <a:endParaRPr lang="nl-BE" dirty="0"/>
-          </a:p>
-          <a:p>
-            <a:pPr marL="152400" indent="0">
-              <a:buNone/>
-            </a:pPr>
-            <a:endParaRPr lang="nl-BE" dirty="0"/>
-          </a:p>
-          <a:p>
-            <a:pPr lvl="1"/>
-            <a:endParaRPr lang="nl-BE" dirty="0"/>
-          </a:p>
-        </p:txBody>
-      </p:sp>
-      <p:sp>
-        <p:nvSpPr>
-          <p:cNvPr id="5" name="Titel 4">
-            <a:extLst>
-              <a:ext uri="{FF2B5EF4-FFF2-40B4-BE49-F238E27FC236}">
-                <a16:creationId xmlns:a16="http://schemas.microsoft.com/office/drawing/2014/main" id="{D0717BD0-3FC4-43AE-94BE-0BBB3BD4F3C6}"/>
-              </a:ext>
-            </a:extLst>
-          </p:cNvPr>
-          <p:cNvSpPr>
-            <a:spLocks noGrp="1"/>
-          </p:cNvSpPr>
-          <p:nvPr>
-            <p:ph type="ctrTitle"/>
-          </p:nvPr>
-        </p:nvSpPr>
-        <p:spPr/>
-        <p:txBody>
-          <a:bodyPr/>
-          <a:lstStyle/>
-          <a:p>
-            <a:r>
-              <a:rPr lang="nl-BE" dirty="0"/>
-              <a:t>Data </a:t>
-            </a:r>
-            <a:r>
-              <a:rPr lang="nl-BE" dirty="0" err="1"/>
-              <a:t>Preparation</a:t>
-            </a:r>
-            <a:r>
-              <a:rPr lang="nl-BE" dirty="0"/>
-              <a:t> </a:t>
-            </a:r>
-          </a:p>
-        </p:txBody>
-      </p:sp>
-      <p:pic>
-        <p:nvPicPr>
-          <p:cNvPr id="4102" name="Picture 6">
-            <a:extLst>
-              <a:ext uri="{FF2B5EF4-FFF2-40B4-BE49-F238E27FC236}">
-                <a16:creationId xmlns:a16="http://schemas.microsoft.com/office/drawing/2014/main" id="{6E35B287-3AFB-4A3F-9DF0-C5C1488CA020}"/>
-              </a:ext>
-            </a:extLst>
-          </p:cNvPr>
-          <p:cNvPicPr>
-            <a:picLocks noChangeAspect="1" noChangeArrowheads="1"/>
-          </p:cNvPicPr>
-          <p:nvPr/>
-        </p:nvPicPr>
-        <p:blipFill>
-          <a:blip r:embed="rId2">
-            <a:extLst>
-              <a:ext uri="{28A0092B-C50C-407E-A947-70E740481C1C}">
-                <a14:useLocalDpi xmlns:a14="http://schemas.microsoft.com/office/drawing/2010/main" val="0"/>
-              </a:ext>
-            </a:extLst>
-          </a:blip>
-          <a:srcRect/>
-          <a:stretch>
-            <a:fillRect/>
-          </a:stretch>
-        </p:blipFill>
-        <p:spPr bwMode="auto">
-          <a:xfrm>
-            <a:off x="3818188" y="700575"/>
-            <a:ext cx="4935352" cy="2470477"/>
-          </a:xfrm>
-          <a:prstGeom prst="rect">
-            <a:avLst/>
-          </a:prstGeom>
-          <a:noFill/>
-          <a:extLst>
-            <a:ext uri="{909E8E84-426E-40DD-AFC4-6F175D3DCCD1}">
-              <a14:hiddenFill xmlns:a14="http://schemas.microsoft.com/office/drawing/2010/main">
-                <a:solidFill>
-                  <a:srgbClr val="FFFFFF"/>
-                </a:solidFill>
-              </a14:hiddenFill>
-            </a:ext>
-          </a:extLst>
-        </p:spPr>
-      </p:pic>
-    </p:spTree>
-    <p:extLst>
-      <p:ext uri="{BB962C8B-B14F-4D97-AF65-F5344CB8AC3E}">
-        <p14:creationId xmlns:p14="http://schemas.microsoft.com/office/powerpoint/2010/main" val="1845498978"/>
       </p:ext>
     </p:extLst>
   </p:cSld>

</xml_diff>